<commit_message>
edicion de power point
</commit_message>
<xml_diff>
--- a/PLANTILLA_PRESENTACION_AVANCES_PROYECTO_.pptx
+++ b/PLANTILLA_PRESENTACION_AVANCES_PROYECTO_.pptx
@@ -18460,6 +18460,36 @@
           </a:p>
         </p:txBody>
       </p:sp>
+      <p:pic>
+        <p:nvPicPr>
+          <p:cNvPr id="2" name="Imagen 1"/>
+          <p:cNvPicPr>
+            <a:picLocks noChangeAspect="1"/>
+          </p:cNvPicPr>
+          <p:nvPr/>
+        </p:nvPicPr>
+        <p:blipFill>
+          <a:blip r:embed="rId2">
+            <a:extLst>
+              <a:ext uri="{28A0092B-C50C-407E-A947-70E740481C1C}">
+                <a14:useLocalDpi xmlns:a14="http://schemas.microsoft.com/office/drawing/2010/main" val="0"/>
+              </a:ext>
+            </a:extLst>
+          </a:blip>
+          <a:stretch>
+            <a:fillRect/>
+          </a:stretch>
+        </p:blipFill>
+        <p:spPr>
+          <a:xfrm>
+            <a:off x="1500188" y="1557338"/>
+            <a:ext cx="9401175" cy="4743449"/>
+          </a:xfrm>
+          <a:prstGeom prst="rect">
+            <a:avLst/>
+          </a:prstGeom>
+        </p:spPr>
+      </p:pic>
     </p:spTree>
     <p:extLst>
       <p:ext uri="{BB962C8B-B14F-4D97-AF65-F5344CB8AC3E}">

</xml_diff>

<commit_message>
casos de uso Deivid
</commit_message>
<xml_diff>
--- a/PLANTILLA_PRESENTACION_AVANCES_PROYECTO_.pptx
+++ b/PLANTILLA_PRESENTACION_AVANCES_PROYECTO_.pptx
@@ -18563,6 +18563,41 @@
           </a:p>
         </p:txBody>
       </p:sp>
+      <p:pic>
+        <p:nvPicPr>
+          <p:cNvPr id="6" name="Imagen 5" descr="Diagrama, Carta&#10;&#10;Descripción generada automáticamente">
+            <a:extLst>
+              <a:ext uri="{FF2B5EF4-FFF2-40B4-BE49-F238E27FC236}">
+                <a16:creationId xmlns:a16="http://schemas.microsoft.com/office/drawing/2014/main" id="{1EC08DBC-9B5E-4779-B084-CAA5662B1A3B}"/>
+              </a:ext>
+            </a:extLst>
+          </p:cNvPr>
+          <p:cNvPicPr>
+            <a:picLocks noChangeAspect="1"/>
+          </p:cNvPicPr>
+          <p:nvPr/>
+        </p:nvPicPr>
+        <p:blipFill rotWithShape="1">
+          <a:blip r:embed="rId2">
+            <a:extLst>
+              <a:ext uri="{28A0092B-C50C-407E-A947-70E740481C1C}">
+                <a14:useLocalDpi xmlns:a14="http://schemas.microsoft.com/office/drawing/2010/main" val="0"/>
+              </a:ext>
+            </a:extLst>
+          </a:blip>
+          <a:srcRect b="56340"/>
+          <a:stretch/>
+        </p:blipFill>
+        <p:spPr>
+          <a:xfrm>
+            <a:off x="956603" y="1688123"/>
+            <a:ext cx="10156874" cy="4164037"/>
+          </a:xfrm>
+          <a:prstGeom prst="rect">
+            <a:avLst/>
+          </a:prstGeom>
+        </p:spPr>
+      </p:pic>
     </p:spTree>
     <p:extLst>
       <p:ext uri="{BB962C8B-B14F-4D97-AF65-F5344CB8AC3E}">

</xml_diff>